<commit_message>
Updated Presentation and Screenshots
</commit_message>
<xml_diff>
--- a/Web Work/PPT.pptx
+++ b/Web Work/PPT.pptx
@@ -5,7 +5,7 @@
     <p:sldMasterId id="2147483767" r:id="rId1"/>
   </p:sldMasterIdLst>
   <p:notesMasterIdLst>
-    <p:notesMasterId r:id="rId9"/>
+    <p:notesMasterId r:id="rId11"/>
   </p:notesMasterIdLst>
   <p:sldIdLst>
     <p:sldId id="256" r:id="rId2"/>
@@ -14,7 +14,9 @@
     <p:sldId id="263" r:id="rId5"/>
     <p:sldId id="277" r:id="rId6"/>
     <p:sldId id="281" r:id="rId7"/>
-    <p:sldId id="276" r:id="rId8"/>
+    <p:sldId id="283" r:id="rId8"/>
+    <p:sldId id="282" r:id="rId9"/>
+    <p:sldId id="276" r:id="rId10"/>
   </p:sldIdLst>
   <p:sldSz cx="12192000" cy="6858000"/>
   <p:notesSz cx="6858000" cy="9144000"/>
@@ -7403,36 +7405,6 @@
           </a:extLst>
         </p:spPr>
       </p:pic>
-      <p:pic>
-        <p:nvPicPr>
-          <p:cNvPr id="8" name="Picture 7">
-            <a:extLst>
-              <a:ext uri="{FF2B5EF4-FFF2-40B4-BE49-F238E27FC236}">
-                <a16:creationId xmlns:a16="http://schemas.microsoft.com/office/drawing/2014/main" id="{236821CB-4BE3-45BC-8C65-9DA4B5144121}"/>
-              </a:ext>
-            </a:extLst>
-          </p:cNvPr>
-          <p:cNvPicPr>
-            <a:picLocks noChangeAspect="1"/>
-          </p:cNvPicPr>
-          <p:nvPr/>
-        </p:nvPicPr>
-        <p:blipFill>
-          <a:blip r:embed="rId3"/>
-          <a:stretch>
-            <a:fillRect/>
-          </a:stretch>
-        </p:blipFill>
-        <p:spPr>
-          <a:xfrm>
-            <a:off x="4359290" y="1731591"/>
-            <a:ext cx="7693187" cy="3601519"/>
-          </a:xfrm>
-          <a:prstGeom prst="rect">
-            <a:avLst/>
-          </a:prstGeom>
-        </p:spPr>
-      </p:pic>
       <p:sp>
         <p:nvSpPr>
           <p:cNvPr id="9" name="TextBox 8">
@@ -7490,7 +7462,7 @@
         <p:spPr>
           <a:xfrm>
             <a:off x="324966" y="3024786"/>
-            <a:ext cx="3723861" cy="646331"/>
+            <a:ext cx="3723861" cy="1200329"/>
           </a:xfrm>
           <a:prstGeom prst="rect">
             <a:avLst/>
@@ -7509,7 +7481,15 @@
                   <a:schemeClr val="bg1"/>
                 </a:solidFill>
               </a:rPr>
-              <a:t>Simple and fast!</a:t>
+              <a:t>The </a:t>
+            </a:r>
+            <a:r>
+              <a:rPr lang="en-IN" sz="3600" dirty="0" smtClean="0">
+                <a:solidFill>
+                  <a:schemeClr val="bg1"/>
+                </a:solidFill>
+              </a:rPr>
+              <a:t>Voice of The Society!</a:t>
             </a:r>
             <a:endParaRPr lang="en-IN" sz="3600" dirty="0">
               <a:solidFill>
@@ -7519,6 +7499,36 @@
           </a:p>
         </p:txBody>
       </p:sp>
+      <p:pic>
+        <p:nvPicPr>
+          <p:cNvPr id="2" name="Picture 1"/>
+          <p:cNvPicPr>
+            <a:picLocks noChangeAspect="1"/>
+          </p:cNvPicPr>
+          <p:nvPr/>
+        </p:nvPicPr>
+        <p:blipFill>
+          <a:blip r:embed="rId3">
+            <a:extLst>
+              <a:ext uri="{28A0092B-C50C-407E-A947-70E740481C1C}">
+                <a14:useLocalDpi xmlns:a14="http://schemas.microsoft.com/office/drawing/2010/main" val="0"/>
+              </a:ext>
+            </a:extLst>
+          </a:blip>
+          <a:stretch>
+            <a:fillRect/>
+          </a:stretch>
+        </p:blipFill>
+        <p:spPr>
+          <a:xfrm>
+            <a:off x="4373793" y="927303"/>
+            <a:ext cx="7722413" cy="4841295"/>
+          </a:xfrm>
+          <a:prstGeom prst="rect">
+            <a:avLst/>
+          </a:prstGeom>
+        </p:spPr>
+      </p:pic>
     </p:spTree>
     <p:extLst>
       <p:ext uri="{BB962C8B-B14F-4D97-AF65-F5344CB8AC3E}">
@@ -7636,96 +7646,6 @@
                             </p:childTnLst>
                           </p:cTn>
                         </p:par>
-                        <p:par>
-                          <p:cTn id="10" fill="hold">
-                            <p:stCondLst>
-                              <p:cond delay="1000"/>
-                            </p:stCondLst>
-                            <p:childTnLst>
-                              <p:par>
-                                <p:cTn id="11" presetID="42" presetClass="entr" presetSubtype="0" fill="hold" nodeType="afterEffect">
-                                  <p:stCondLst>
-                                    <p:cond delay="0"/>
-                                  </p:stCondLst>
-                                  <p:childTnLst>
-                                    <p:set>
-                                      <p:cBhvr>
-                                        <p:cTn id="12" dur="1" fill="hold">
-                                          <p:stCondLst>
-                                            <p:cond delay="0"/>
-                                          </p:stCondLst>
-                                        </p:cTn>
-                                        <p:tgtEl>
-                                          <p:spTgt spid="8"/>
-                                        </p:tgtEl>
-                                        <p:attrNameLst>
-                                          <p:attrName>style.visibility</p:attrName>
-                                        </p:attrNameLst>
-                                      </p:cBhvr>
-                                      <p:to>
-                                        <p:strVal val="visible"/>
-                                      </p:to>
-                                    </p:set>
-                                    <p:animEffect transition="in" filter="fade">
-                                      <p:cBhvr>
-                                        <p:cTn id="13" dur="1000"/>
-                                        <p:tgtEl>
-                                          <p:spTgt spid="8"/>
-                                        </p:tgtEl>
-                                      </p:cBhvr>
-                                    </p:animEffect>
-                                    <p:anim calcmode="lin" valueType="num">
-                                      <p:cBhvr>
-                                        <p:cTn id="14" dur="1000" fill="hold"/>
-                                        <p:tgtEl>
-                                          <p:spTgt spid="8"/>
-                                        </p:tgtEl>
-                                        <p:attrNameLst>
-                                          <p:attrName>ppt_x</p:attrName>
-                                        </p:attrNameLst>
-                                      </p:cBhvr>
-                                      <p:tavLst>
-                                        <p:tav tm="0">
-                                          <p:val>
-                                            <p:strVal val="#ppt_x"/>
-                                          </p:val>
-                                        </p:tav>
-                                        <p:tav tm="100000">
-                                          <p:val>
-                                            <p:strVal val="#ppt_x"/>
-                                          </p:val>
-                                        </p:tav>
-                                      </p:tavLst>
-                                    </p:anim>
-                                    <p:anim calcmode="lin" valueType="num">
-                                      <p:cBhvr>
-                                        <p:cTn id="15" dur="1000" fill="hold"/>
-                                        <p:tgtEl>
-                                          <p:spTgt spid="8"/>
-                                        </p:tgtEl>
-                                        <p:attrNameLst>
-                                          <p:attrName>ppt_y</p:attrName>
-                                        </p:attrNameLst>
-                                      </p:cBhvr>
-                                      <p:tavLst>
-                                        <p:tav tm="0">
-                                          <p:val>
-                                            <p:strVal val="#ppt_y+.1"/>
-                                          </p:val>
-                                        </p:tav>
-                                        <p:tav tm="100000">
-                                          <p:val>
-                                            <p:strVal val="#ppt_y"/>
-                                          </p:val>
-                                        </p:tav>
-                                      </p:tavLst>
-                                    </p:anim>
-                                  </p:childTnLst>
-                                </p:cTn>
-                              </p:par>
-                            </p:childTnLst>
-                          </p:cTn>
-                        </p:par>
                       </p:childTnLst>
                     </p:cTn>
                   </p:par>
@@ -7784,7 +7704,12 @@
             <p:ph type="title"/>
           </p:nvPr>
         </p:nvSpPr>
-        <p:spPr/>
+        <p:spPr>
+          <a:xfrm>
+            <a:off x="1071155" y="199505"/>
+            <a:ext cx="10557372" cy="1492132"/>
+          </a:xfrm>
+        </p:spPr>
         <p:txBody>
           <a:bodyPr/>
           <a:lstStyle/>
@@ -7792,7 +7717,11 @@
             <a:pPr algn="ctr"/>
             <a:r>
               <a:rPr lang="en-US" dirty="0" smtClean="0"/>
-              <a:t>Home</a:t>
+              <a:t>Home PAGE</a:t>
+            </a:r>
+            <a:r>
+              <a:rPr lang="en-US" dirty="0" smtClean="0"/>
+              <a:t/>
             </a:r>
             <a:br>
               <a:rPr lang="en-US" dirty="0" smtClean="0"/>
@@ -7803,78 +7732,338 @@
       </p:sp>
       <p:pic>
         <p:nvPicPr>
-          <p:cNvPr id="8" name="Picture 7">
-            <a:extLst>
-              <a:ext uri="{FF2B5EF4-FFF2-40B4-BE49-F238E27FC236}">
-                <a16:creationId xmlns:a16="http://schemas.microsoft.com/office/drawing/2014/main" id="{4F4F41C1-AA24-40B1-A11A-BA18E5629EC1}"/>
-              </a:ext>
-            </a:extLst>
-          </p:cNvPr>
+          <p:cNvPr id="4" name="Picture 3"/>
           <p:cNvPicPr>
             <a:picLocks noChangeAspect="1"/>
           </p:cNvPicPr>
           <p:nvPr/>
         </p:nvPicPr>
-        <p:blipFill rotWithShape="1">
-          <a:blip r:embed="rId2"/>
-          <a:srcRect l="1661" r="12528" b="40988"/>
-          <a:stretch/>
+        <p:blipFill>
+          <a:blip r:embed="rId2">
+            <a:extLst>
+              <a:ext uri="{28A0092B-C50C-407E-A947-70E740481C1C}">
+                <a14:useLocalDpi xmlns:a14="http://schemas.microsoft.com/office/drawing/2010/main" val="0"/>
+              </a:ext>
+            </a:extLst>
+          </a:blip>
+          <a:stretch>
+            <a:fillRect/>
+          </a:stretch>
         </p:blipFill>
         <p:spPr>
           <a:xfrm>
-            <a:off x="1013464" y="1422556"/>
-            <a:ext cx="10654750" cy="2926343"/>
+            <a:off x="1071155" y="1172685"/>
+            <a:ext cx="10557372" cy="5241178"/>
           </a:xfrm>
           <a:prstGeom prst="rect">
             <a:avLst/>
           </a:prstGeom>
         </p:spPr>
       </p:pic>
+    </p:spTree>
+    <p:extLst>
+      <p:ext uri="{BB962C8B-B14F-4D97-AF65-F5344CB8AC3E}">
+        <p14:creationId xmlns:p14="http://schemas.microsoft.com/office/powerpoint/2010/main" val="2100220246"/>
+      </p:ext>
+    </p:extLst>
+  </p:cSld>
+  <p:clrMapOvr>
+    <a:masterClrMapping/>
+  </p:clrMapOvr>
+  <p:timing>
+    <p:tnLst>
+      <p:par>
+        <p:cTn id="1" dur="indefinite" restart="never" nodeType="tmRoot"/>
+      </p:par>
+    </p:tnLst>
+  </p:timing>
+</p:sld>
+</file>
+
+<file path=ppt/slides/slide4.xml><?xml version="1.0" encoding="utf-8"?>
+<p:sld xmlns:a="http://schemas.openxmlformats.org/drawingml/2006/main" xmlns:r="http://schemas.openxmlformats.org/officeDocument/2006/relationships" xmlns:p="http://schemas.openxmlformats.org/presentationml/2006/main">
+  <p:cSld>
+    <p:spTree>
+      <p:nvGrpSpPr>
+        <p:cNvPr id="1" name=""/>
+        <p:cNvGrpSpPr/>
+        <p:nvPr/>
+      </p:nvGrpSpPr>
+      <p:grpSpPr>
+        <a:xfrm>
+          <a:off x="0" y="0"/>
+          <a:ext cx="0" cy="0"/>
+          <a:chOff x="0" y="0"/>
+          <a:chExt cx="0" cy="0"/>
+        </a:xfrm>
+      </p:grpSpPr>
+      <p:pic>
+        <p:nvPicPr>
+          <p:cNvPr id="4098" name="Picture 2"/>
+          <p:cNvPicPr>
+            <a:picLocks noChangeAspect="1" noChangeArrowheads="1"/>
+          </p:cNvPicPr>
+          <p:nvPr/>
+        </p:nvPicPr>
+        <p:blipFill>
+          <a:blip r:embed="rId2">
+            <a:clrChange>
+              <a:clrFrom>
+                <a:srgbClr val="FFFFFF"/>
+              </a:clrFrom>
+              <a:clrTo>
+                <a:srgbClr val="FFFFFF">
+                  <a:alpha val="0"/>
+                </a:srgbClr>
+              </a:clrTo>
+            </a:clrChange>
+            <a:extLst>
+              <a:ext uri="{28A0092B-C50C-407E-A947-70E740481C1C}">
+                <a14:useLocalDpi xmlns:a14="http://schemas.microsoft.com/office/drawing/2010/main" val="0"/>
+              </a:ext>
+            </a:extLst>
+          </a:blip>
+          <a:srcRect/>
+          <a:stretch>
+            <a:fillRect/>
+          </a:stretch>
+        </p:blipFill>
+        <p:spPr bwMode="auto">
+          <a:xfrm>
+            <a:off x="-33954" y="-293916"/>
+            <a:ext cx="12416454" cy="7704365"/>
+          </a:xfrm>
+          <a:prstGeom prst="rect">
+            <a:avLst/>
+          </a:prstGeom>
+          <a:noFill/>
+          <a:extLst>
+            <a:ext uri="{909E8E84-426E-40DD-AFC4-6F175D3DCCD1}">
+              <a14:hiddenFill xmlns:a14="http://schemas.microsoft.com/office/drawing/2010/main">
+                <a:solidFill>
+                  <a:srgbClr val="FFFFFF"/>
+                </a:solidFill>
+              </a14:hiddenFill>
+            </a:ext>
+          </a:extLst>
+        </p:spPr>
+      </p:pic>
       <p:sp>
         <p:nvSpPr>
-          <p:cNvPr id="3" name="Rectangle 2"/>
-          <p:cNvSpPr/>
+          <p:cNvPr id="7" name="TextBox 6"/>
+          <p:cNvSpPr txBox="1"/>
           <p:nvPr/>
         </p:nvSpPr>
         <p:spPr>
           <a:xfrm>
-            <a:off x="2351964" y="4989227"/>
-            <a:ext cx="8470710" cy="1015663"/>
+            <a:off x="7814938" y="117480"/>
+            <a:ext cx="4377062" cy="769441"/>
+          </a:xfrm>
+          <a:prstGeom prst="rect">
+            <a:avLst/>
+          </a:prstGeom>
+          <a:noFill/>
+        </p:spPr>
+        <p:txBody>
+          <a:bodyPr wrap="square" rtlCol="0">
+            <a:spAutoFit/>
+          </a:bodyPr>
+          <a:lstStyle/>
+          <a:p>
+            <a:pPr algn="ctr"/>
+            <a:r>
+              <a:rPr lang="en-US" sz="4400" b="1" dirty="0" smtClean="0">
+                <a:solidFill>
+                  <a:srgbClr val="FAC540"/>
+                </a:solidFill>
+                <a:latin typeface="Arial" panose="020B0604020202020204" pitchFamily="34" charset="0"/>
+              </a:rPr>
+              <a:t>Smart Charts</a:t>
+            </a:r>
+            <a:endParaRPr lang="en-US" sz="4400" b="1" dirty="0">
+              <a:solidFill>
+                <a:srgbClr val="FAC540"/>
+              </a:solidFill>
+              <a:latin typeface="Arial" panose="020B0604020202020204" pitchFamily="34" charset="0"/>
+            </a:endParaRPr>
+          </a:p>
+        </p:txBody>
+      </p:sp>
+      <p:sp>
+        <p:nvSpPr>
+          <p:cNvPr id="8" name="TextBox 7">
+            <a:extLst>
+              <a:ext uri="{FF2B5EF4-FFF2-40B4-BE49-F238E27FC236}">
+                <a16:creationId xmlns:a16="http://schemas.microsoft.com/office/drawing/2014/main" id="{19F62868-1AE2-418D-8A3C-0CEB6F3D8CAF}"/>
+              </a:ext>
+            </a:extLst>
+          </p:cNvPr>
+          <p:cNvSpPr txBox="1"/>
+          <p:nvPr/>
+        </p:nvSpPr>
+        <p:spPr>
+          <a:xfrm>
+            <a:off x="8214425" y="1298317"/>
+            <a:ext cx="3578087" cy="3108543"/>
+          </a:xfrm>
+          <a:prstGeom prst="rect">
+            <a:avLst/>
+          </a:prstGeom>
+          <a:noFill/>
+        </p:spPr>
+        <p:txBody>
+          <a:bodyPr wrap="square" rtlCol="0">
+            <a:spAutoFit/>
+          </a:bodyPr>
+          <a:lstStyle/>
+          <a:p>
+            <a:r>
+              <a:rPr lang="en-IN" sz="2800" dirty="0" smtClean="0">
+                <a:solidFill>
+                  <a:schemeClr val="bg1"/>
+                </a:solidFill>
+              </a:rPr>
+              <a:t>1</a:t>
+            </a:r>
+            <a:r>
+              <a:rPr lang="en-IN" sz="2800" baseline="30000" dirty="0" smtClean="0">
+                <a:solidFill>
+                  <a:schemeClr val="bg1"/>
+                </a:solidFill>
+              </a:rPr>
+              <a:t>st</a:t>
+            </a:r>
+            <a:r>
+              <a:rPr lang="en-IN" sz="2800" dirty="0" smtClean="0">
+                <a:solidFill>
+                  <a:schemeClr val="bg1"/>
+                </a:solidFill>
+              </a:rPr>
+              <a:t> Graph: Categorical Segmentation of Sentiments into positive, negative, and neutral classes.</a:t>
+            </a:r>
+            <a:endParaRPr lang="en-IN" sz="2800" dirty="0">
+              <a:solidFill>
+                <a:schemeClr val="bg1"/>
+              </a:solidFill>
+            </a:endParaRPr>
+          </a:p>
+          <a:p>
+            <a:endParaRPr lang="en-IN" sz="2800" dirty="0">
+              <a:solidFill>
+                <a:schemeClr val="bg1"/>
+              </a:solidFill>
+            </a:endParaRPr>
+          </a:p>
+          <a:p>
+            <a:endParaRPr lang="en-IN" sz="2800" dirty="0">
+              <a:solidFill>
+                <a:schemeClr val="bg1"/>
+              </a:solidFill>
+            </a:endParaRPr>
+          </a:p>
+        </p:txBody>
+      </p:sp>
+      <p:sp>
+        <p:nvSpPr>
+          <p:cNvPr id="9" name="TextBox 8">
+            <a:extLst>
+              <a:ext uri="{FF2B5EF4-FFF2-40B4-BE49-F238E27FC236}">
+                <a16:creationId xmlns:a16="http://schemas.microsoft.com/office/drawing/2014/main" id="{0A28CFD3-E145-42AF-A70C-91037EF05AA0}"/>
+              </a:ext>
+            </a:extLst>
+          </p:cNvPr>
+          <p:cNvSpPr txBox="1"/>
+          <p:nvPr/>
+        </p:nvSpPr>
+        <p:spPr>
+          <a:xfrm>
+            <a:off x="8214425" y="4014504"/>
+            <a:ext cx="4015408" cy="1384995"/>
+          </a:xfrm>
+          <a:prstGeom prst="rect">
+            <a:avLst/>
+          </a:prstGeom>
+          <a:noFill/>
+        </p:spPr>
+        <p:txBody>
+          <a:bodyPr wrap="square" rtlCol="0">
+            <a:spAutoFit/>
+          </a:bodyPr>
+          <a:lstStyle/>
+          <a:p>
+            <a:r>
+              <a:rPr lang="en-IN" sz="2800" dirty="0" smtClean="0">
+                <a:solidFill>
+                  <a:schemeClr val="bg1"/>
+                </a:solidFill>
+              </a:rPr>
+              <a:t>2</a:t>
+            </a:r>
+            <a:r>
+              <a:rPr lang="en-IN" sz="2800" baseline="30000" dirty="0" smtClean="0">
+                <a:solidFill>
+                  <a:schemeClr val="bg1"/>
+                </a:solidFill>
+              </a:rPr>
+              <a:t>nd</a:t>
+            </a:r>
+            <a:r>
+              <a:rPr lang="en-IN" sz="2800" dirty="0" smtClean="0">
+                <a:solidFill>
+                  <a:schemeClr val="bg1"/>
+                </a:solidFill>
+              </a:rPr>
+              <a:t> Graph: Popularity of entity entered by the user.</a:t>
+            </a:r>
+            <a:endParaRPr lang="en-IN" sz="2800" dirty="0">
+              <a:solidFill>
+                <a:schemeClr val="bg1"/>
+              </a:solidFill>
+            </a:endParaRPr>
+          </a:p>
+          <a:p>
+            <a:endParaRPr lang="en-IN" sz="2800" dirty="0">
+              <a:solidFill>
+                <a:schemeClr val="bg1"/>
+              </a:solidFill>
+            </a:endParaRPr>
+          </a:p>
+        </p:txBody>
+      </p:sp>
+      <p:pic>
+        <p:nvPicPr>
+          <p:cNvPr id="2" name="Picture 1"/>
+          <p:cNvPicPr>
+            <a:picLocks noChangeAspect="1"/>
+          </p:cNvPicPr>
+          <p:nvPr/>
+        </p:nvPicPr>
+        <p:blipFill>
+          <a:blip r:embed="rId3">
+            <a:extLst>
+              <a:ext uri="{28A0092B-C50C-407E-A947-70E740481C1C}">
+                <a14:useLocalDpi xmlns:a14="http://schemas.microsoft.com/office/drawing/2010/main" val="0"/>
+              </a:ext>
+            </a:extLst>
+          </a:blip>
+          <a:stretch>
+            <a:fillRect/>
+          </a:stretch>
+        </p:blipFill>
+        <p:spPr>
+          <a:xfrm>
+            <a:off x="164444" y="1637030"/>
+            <a:ext cx="7612660" cy="3588113"/>
           </a:xfrm>
           <a:prstGeom prst="rect">
             <a:avLst/>
           </a:prstGeom>
         </p:spPr>
-        <p:txBody>
-          <a:bodyPr wrap="square">
-            <a:spAutoFit/>
-          </a:bodyPr>
-          <a:lstStyle/>
-          <a:p>
-            <a:r>
-              <a:rPr lang="en-IN" sz="3000" dirty="0"/>
-              <a:t>This </a:t>
-            </a:r>
-            <a:r>
-              <a:rPr lang="en-IN" sz="3000" dirty="0" smtClean="0"/>
-              <a:t>Front-Page </a:t>
-            </a:r>
-            <a:r>
-              <a:rPr lang="en-IN" sz="3000" dirty="0"/>
-              <a:t>shows details of your financial record like a/c balance, loans paid, fixed Deposit </a:t>
-            </a:r>
-            <a:r>
-              <a:rPr lang="en-IN" sz="3000" dirty="0" err="1"/>
-              <a:t>etc</a:t>
-            </a:r>
-            <a:endParaRPr lang="en-IN" sz="3000" dirty="0"/>
-          </a:p>
-        </p:txBody>
-      </p:sp>
+      </p:pic>
     </p:spTree>
     <p:extLst>
       <p:ext uri="{BB962C8B-B14F-4D97-AF65-F5344CB8AC3E}">
-        <p14:creationId xmlns:p14="http://schemas.microsoft.com/office/powerpoint/2010/main" val="2100220246"/>
+        <p14:creationId xmlns:p14="http://schemas.microsoft.com/office/powerpoint/2010/main" val="4228262639"/>
       </p:ext>
     </p:extLst>
   </p:cSld>
@@ -7905,7 +8094,7 @@
                             </p:stCondLst>
                             <p:childTnLst>
                               <p:par>
-                                <p:cTn id="5" presetID="42" presetClass="entr" presetSubtype="0" fill="hold" nodeType="afterEffect">
+                                <p:cTn id="5" presetID="42" presetClass="entr" presetSubtype="0" fill="hold" grpId="0" nodeType="afterEffect">
                                   <p:stCondLst>
                                     <p:cond delay="0"/>
                                   </p:stCondLst>
@@ -8008,7 +8197,7 @@
                                           </p:stCondLst>
                                         </p:cTn>
                                         <p:tgtEl>
-                                          <p:spTgt spid="3"/>
+                                          <p:spTgt spid="9"/>
                                         </p:tgtEl>
                                         <p:attrNameLst>
                                           <p:attrName>style.visibility</p:attrName>
@@ -8022,589 +8211,13 @@
                                       <p:cBhvr>
                                         <p:cTn id="13" dur="1000"/>
                                         <p:tgtEl>
-                                          <p:spTgt spid="3"/>
+                                          <p:spTgt spid="9"/>
                                         </p:tgtEl>
                                       </p:cBhvr>
                                     </p:animEffect>
                                     <p:anim calcmode="lin" valueType="num">
                                       <p:cBhvr>
                                         <p:cTn id="14" dur="1000" fill="hold"/>
-                                        <p:tgtEl>
-                                          <p:spTgt spid="3"/>
-                                        </p:tgtEl>
-                                        <p:attrNameLst>
-                                          <p:attrName>ppt_x</p:attrName>
-                                        </p:attrNameLst>
-                                      </p:cBhvr>
-                                      <p:tavLst>
-                                        <p:tav tm="0">
-                                          <p:val>
-                                            <p:strVal val="#ppt_x"/>
-                                          </p:val>
-                                        </p:tav>
-                                        <p:tav tm="100000">
-                                          <p:val>
-                                            <p:strVal val="#ppt_x"/>
-                                          </p:val>
-                                        </p:tav>
-                                      </p:tavLst>
-                                    </p:anim>
-                                    <p:anim calcmode="lin" valueType="num">
-                                      <p:cBhvr>
-                                        <p:cTn id="15" dur="1000" fill="hold"/>
-                                        <p:tgtEl>
-                                          <p:spTgt spid="3"/>
-                                        </p:tgtEl>
-                                        <p:attrNameLst>
-                                          <p:attrName>ppt_y</p:attrName>
-                                        </p:attrNameLst>
-                                      </p:cBhvr>
-                                      <p:tavLst>
-                                        <p:tav tm="0">
-                                          <p:val>
-                                            <p:strVal val="#ppt_y+.1"/>
-                                          </p:val>
-                                        </p:tav>
-                                        <p:tav tm="100000">
-                                          <p:val>
-                                            <p:strVal val="#ppt_y"/>
-                                          </p:val>
-                                        </p:tav>
-                                      </p:tavLst>
-                                    </p:anim>
-                                  </p:childTnLst>
-                                </p:cTn>
-                              </p:par>
-                            </p:childTnLst>
-                          </p:cTn>
-                        </p:par>
-                      </p:childTnLst>
-                    </p:cTn>
-                  </p:par>
-                </p:childTnLst>
-              </p:cTn>
-              <p:prevCondLst>
-                <p:cond evt="onPrev" delay="0">
-                  <p:tgtEl>
-                    <p:sldTgt/>
-                  </p:tgtEl>
-                </p:cond>
-              </p:prevCondLst>
-              <p:nextCondLst>
-                <p:cond evt="onNext" delay="0">
-                  <p:tgtEl>
-                    <p:sldTgt/>
-                  </p:tgtEl>
-                </p:cond>
-              </p:nextCondLst>
-            </p:seq>
-          </p:childTnLst>
-        </p:cTn>
-      </p:par>
-    </p:tnLst>
-    <p:bldLst>
-      <p:bldP spid="3" grpId="0"/>
-    </p:bldLst>
-  </p:timing>
-</p:sld>
-</file>
-
-<file path=ppt/slides/slide4.xml><?xml version="1.0" encoding="utf-8"?>
-<p:sld xmlns:a="http://schemas.openxmlformats.org/drawingml/2006/main" xmlns:r="http://schemas.openxmlformats.org/officeDocument/2006/relationships" xmlns:p="http://schemas.openxmlformats.org/presentationml/2006/main">
-  <p:cSld>
-    <p:spTree>
-      <p:nvGrpSpPr>
-        <p:cNvPr id="1" name=""/>
-        <p:cNvGrpSpPr/>
-        <p:nvPr/>
-      </p:nvGrpSpPr>
-      <p:grpSpPr>
-        <a:xfrm>
-          <a:off x="0" y="0"/>
-          <a:ext cx="0" cy="0"/>
-          <a:chOff x="0" y="0"/>
-          <a:chExt cx="0" cy="0"/>
-        </a:xfrm>
-      </p:grpSpPr>
-      <p:pic>
-        <p:nvPicPr>
-          <p:cNvPr id="4098" name="Picture 2"/>
-          <p:cNvPicPr>
-            <a:picLocks noChangeAspect="1" noChangeArrowheads="1"/>
-          </p:cNvPicPr>
-          <p:nvPr/>
-        </p:nvPicPr>
-        <p:blipFill>
-          <a:blip r:embed="rId2">
-            <a:clrChange>
-              <a:clrFrom>
-                <a:srgbClr val="FFFFFF"/>
-              </a:clrFrom>
-              <a:clrTo>
-                <a:srgbClr val="FFFFFF">
-                  <a:alpha val="0"/>
-                </a:srgbClr>
-              </a:clrTo>
-            </a:clrChange>
-            <a:extLst>
-              <a:ext uri="{28A0092B-C50C-407E-A947-70E740481C1C}">
-                <a14:useLocalDpi xmlns:a14="http://schemas.microsoft.com/office/drawing/2010/main" val="0"/>
-              </a:ext>
-            </a:extLst>
-          </a:blip>
-          <a:srcRect/>
-          <a:stretch>
-            <a:fillRect/>
-          </a:stretch>
-        </p:blipFill>
-        <p:spPr bwMode="auto">
-          <a:xfrm>
-            <a:off x="-33954" y="-293916"/>
-            <a:ext cx="12416454" cy="7704365"/>
-          </a:xfrm>
-          <a:prstGeom prst="rect">
-            <a:avLst/>
-          </a:prstGeom>
-          <a:noFill/>
-          <a:extLst>
-            <a:ext uri="{909E8E84-426E-40DD-AFC4-6F175D3DCCD1}">
-              <a14:hiddenFill xmlns:a14="http://schemas.microsoft.com/office/drawing/2010/main">
-                <a:solidFill>
-                  <a:srgbClr val="FFFFFF"/>
-                </a:solidFill>
-              </a14:hiddenFill>
-            </a:ext>
-          </a:extLst>
-        </p:spPr>
-      </p:pic>
-      <p:sp>
-        <p:nvSpPr>
-          <p:cNvPr id="7" name="TextBox 6"/>
-          <p:cNvSpPr txBox="1"/>
-          <p:nvPr/>
-        </p:nvSpPr>
-        <p:spPr>
-          <a:xfrm>
-            <a:off x="7814938" y="117480"/>
-            <a:ext cx="4377062" cy="769441"/>
-          </a:xfrm>
-          <a:prstGeom prst="rect">
-            <a:avLst/>
-          </a:prstGeom>
-          <a:noFill/>
-        </p:spPr>
-        <p:txBody>
-          <a:bodyPr wrap="square" rtlCol="0">
-            <a:spAutoFit/>
-          </a:bodyPr>
-          <a:lstStyle/>
-          <a:p>
-            <a:pPr algn="ctr"/>
-            <a:r>
-              <a:rPr lang="en-US" sz="4400" b="1" dirty="0" smtClean="0">
-                <a:solidFill>
-                  <a:srgbClr val="FAC540"/>
-                </a:solidFill>
-                <a:latin typeface="Arial" panose="020B0604020202020204" pitchFamily="34" charset="0"/>
-              </a:rPr>
-              <a:t>Loan Adviser</a:t>
-            </a:r>
-            <a:endParaRPr lang="en-US" sz="4400" b="1" dirty="0">
-              <a:solidFill>
-                <a:srgbClr val="FAC540"/>
-              </a:solidFill>
-              <a:latin typeface="Arial" panose="020B0604020202020204" pitchFamily="34" charset="0"/>
-            </a:endParaRPr>
-          </a:p>
-        </p:txBody>
-      </p:sp>
-      <p:pic>
-        <p:nvPicPr>
-          <p:cNvPr id="6" name="Picture 5">
-            <a:extLst>
-              <a:ext uri="{FF2B5EF4-FFF2-40B4-BE49-F238E27FC236}">
-                <a16:creationId xmlns:a16="http://schemas.microsoft.com/office/drawing/2014/main" id="{052AB5F6-714F-40BD-A7F9-6D8DA715CA76}"/>
-              </a:ext>
-            </a:extLst>
-          </p:cNvPr>
-          <p:cNvPicPr>
-            <a:picLocks noChangeAspect="1"/>
-          </p:cNvPicPr>
-          <p:nvPr/>
-        </p:nvPicPr>
-        <p:blipFill>
-          <a:blip r:embed="rId3"/>
-          <a:stretch>
-            <a:fillRect/>
-          </a:stretch>
-        </p:blipFill>
-        <p:spPr>
-          <a:xfrm>
-            <a:off x="290482" y="886921"/>
-            <a:ext cx="7200021" cy="5261970"/>
-          </a:xfrm>
-          <a:prstGeom prst="rect">
-            <a:avLst/>
-          </a:prstGeom>
-        </p:spPr>
-      </p:pic>
-      <p:sp>
-        <p:nvSpPr>
-          <p:cNvPr id="8" name="TextBox 7">
-            <a:extLst>
-              <a:ext uri="{FF2B5EF4-FFF2-40B4-BE49-F238E27FC236}">
-                <a16:creationId xmlns:a16="http://schemas.microsoft.com/office/drawing/2014/main" id="{19F62868-1AE2-418D-8A3C-0CEB6F3D8CAF}"/>
-              </a:ext>
-            </a:extLst>
-          </p:cNvPr>
-          <p:cNvSpPr txBox="1"/>
-          <p:nvPr/>
-        </p:nvSpPr>
-        <p:spPr>
-          <a:xfrm>
-            <a:off x="8214425" y="1298317"/>
-            <a:ext cx="3578087" cy="3108543"/>
-          </a:xfrm>
-          <a:prstGeom prst="rect">
-            <a:avLst/>
-          </a:prstGeom>
-          <a:noFill/>
-        </p:spPr>
-        <p:txBody>
-          <a:bodyPr wrap="square" rtlCol="0">
-            <a:spAutoFit/>
-          </a:bodyPr>
-          <a:lstStyle/>
-          <a:p>
-            <a:r>
-              <a:rPr lang="en-IN" sz="2800" dirty="0">
-                <a:solidFill>
-                  <a:schemeClr val="bg1"/>
-                </a:solidFill>
-              </a:rPr>
-              <a:t>X-axis : Time</a:t>
-            </a:r>
-          </a:p>
-          <a:p>
-            <a:r>
-              <a:rPr lang="en-IN" sz="2800" dirty="0">
-                <a:solidFill>
-                  <a:schemeClr val="bg1"/>
-                </a:solidFill>
-              </a:rPr>
-              <a:t>Y-axis : Loan amount that you are eligible for according to our system.</a:t>
-            </a:r>
-          </a:p>
-          <a:p>
-            <a:endParaRPr lang="en-IN" sz="2800" dirty="0">
-              <a:solidFill>
-                <a:schemeClr val="bg1"/>
-              </a:solidFill>
-            </a:endParaRPr>
-          </a:p>
-          <a:p>
-            <a:endParaRPr lang="en-IN" sz="2800" dirty="0">
-              <a:solidFill>
-                <a:schemeClr val="bg1"/>
-              </a:solidFill>
-            </a:endParaRPr>
-          </a:p>
-        </p:txBody>
-      </p:sp>
-      <p:sp>
-        <p:nvSpPr>
-          <p:cNvPr id="9" name="TextBox 8">
-            <a:extLst>
-              <a:ext uri="{FF2B5EF4-FFF2-40B4-BE49-F238E27FC236}">
-                <a16:creationId xmlns:a16="http://schemas.microsoft.com/office/drawing/2014/main" id="{0A28CFD3-E145-42AF-A70C-91037EF05AA0}"/>
-              </a:ext>
-            </a:extLst>
-          </p:cNvPr>
-          <p:cNvSpPr txBox="1"/>
-          <p:nvPr/>
-        </p:nvSpPr>
-        <p:spPr>
-          <a:xfrm>
-            <a:off x="8214425" y="4014504"/>
-            <a:ext cx="4015408" cy="2677656"/>
-          </a:xfrm>
-          <a:prstGeom prst="rect">
-            <a:avLst/>
-          </a:prstGeom>
-          <a:noFill/>
-        </p:spPr>
-        <p:txBody>
-          <a:bodyPr wrap="square" rtlCol="0">
-            <a:spAutoFit/>
-          </a:bodyPr>
-          <a:lstStyle/>
-          <a:p>
-            <a:r>
-              <a:rPr lang="en-IN" sz="2800" dirty="0">
-                <a:solidFill>
-                  <a:schemeClr val="bg1"/>
-                </a:solidFill>
-              </a:rPr>
-              <a:t>Real time evaluation of your financial record, based on which a loan amount for which you’re eligible is displayed.</a:t>
-            </a:r>
-          </a:p>
-          <a:p>
-            <a:endParaRPr lang="en-IN" sz="2800" dirty="0">
-              <a:solidFill>
-                <a:schemeClr val="bg1"/>
-              </a:solidFill>
-            </a:endParaRPr>
-          </a:p>
-        </p:txBody>
-      </p:sp>
-    </p:spTree>
-    <p:extLst>
-      <p:ext uri="{BB962C8B-B14F-4D97-AF65-F5344CB8AC3E}">
-        <p14:creationId xmlns:p14="http://schemas.microsoft.com/office/powerpoint/2010/main" val="4228262639"/>
-      </p:ext>
-    </p:extLst>
-  </p:cSld>
-  <p:clrMapOvr>
-    <a:masterClrMapping/>
-  </p:clrMapOvr>
-  <p:timing>
-    <p:tnLst>
-      <p:par>
-        <p:cTn id="1" dur="indefinite" restart="never" nodeType="tmRoot">
-          <p:childTnLst>
-            <p:seq concurrent="1" nextAc="seek">
-              <p:cTn id="2" dur="indefinite" nodeType="mainSeq">
-                <p:childTnLst>
-                  <p:par>
-                    <p:cTn id="3" fill="hold">
-                      <p:stCondLst>
-                        <p:cond delay="indefinite"/>
-                        <p:cond evt="onBegin" delay="0">
-                          <p:tn val="2"/>
-                        </p:cond>
-                      </p:stCondLst>
-                      <p:childTnLst>
-                        <p:par>
-                          <p:cTn id="4" fill="hold">
-                            <p:stCondLst>
-                              <p:cond delay="0"/>
-                            </p:stCondLst>
-                            <p:childTnLst>
-                              <p:par>
-                                <p:cTn id="5" presetID="42" presetClass="entr" presetSubtype="0" fill="hold" nodeType="afterEffect">
-                                  <p:stCondLst>
-                                    <p:cond delay="0"/>
-                                  </p:stCondLst>
-                                  <p:childTnLst>
-                                    <p:set>
-                                      <p:cBhvr>
-                                        <p:cTn id="6" dur="1" fill="hold">
-                                          <p:stCondLst>
-                                            <p:cond delay="0"/>
-                                          </p:stCondLst>
-                                        </p:cTn>
-                                        <p:tgtEl>
-                                          <p:spTgt spid="6"/>
-                                        </p:tgtEl>
-                                        <p:attrNameLst>
-                                          <p:attrName>style.visibility</p:attrName>
-                                        </p:attrNameLst>
-                                      </p:cBhvr>
-                                      <p:to>
-                                        <p:strVal val="visible"/>
-                                      </p:to>
-                                    </p:set>
-                                    <p:animEffect transition="in" filter="fade">
-                                      <p:cBhvr>
-                                        <p:cTn id="7" dur="1000"/>
-                                        <p:tgtEl>
-                                          <p:spTgt spid="6"/>
-                                        </p:tgtEl>
-                                      </p:cBhvr>
-                                    </p:animEffect>
-                                    <p:anim calcmode="lin" valueType="num">
-                                      <p:cBhvr>
-                                        <p:cTn id="8" dur="1000" fill="hold"/>
-                                        <p:tgtEl>
-                                          <p:spTgt spid="6"/>
-                                        </p:tgtEl>
-                                        <p:attrNameLst>
-                                          <p:attrName>ppt_x</p:attrName>
-                                        </p:attrNameLst>
-                                      </p:cBhvr>
-                                      <p:tavLst>
-                                        <p:tav tm="0">
-                                          <p:val>
-                                            <p:strVal val="#ppt_x"/>
-                                          </p:val>
-                                        </p:tav>
-                                        <p:tav tm="100000">
-                                          <p:val>
-                                            <p:strVal val="#ppt_x"/>
-                                          </p:val>
-                                        </p:tav>
-                                      </p:tavLst>
-                                    </p:anim>
-                                    <p:anim calcmode="lin" valueType="num">
-                                      <p:cBhvr>
-                                        <p:cTn id="9" dur="1000" fill="hold"/>
-                                        <p:tgtEl>
-                                          <p:spTgt spid="6"/>
-                                        </p:tgtEl>
-                                        <p:attrNameLst>
-                                          <p:attrName>ppt_y</p:attrName>
-                                        </p:attrNameLst>
-                                      </p:cBhvr>
-                                      <p:tavLst>
-                                        <p:tav tm="0">
-                                          <p:val>
-                                            <p:strVal val="#ppt_y+.1"/>
-                                          </p:val>
-                                        </p:tav>
-                                        <p:tav tm="100000">
-                                          <p:val>
-                                            <p:strVal val="#ppt_y"/>
-                                          </p:val>
-                                        </p:tav>
-                                      </p:tavLst>
-                                    </p:anim>
-                                  </p:childTnLst>
-                                </p:cTn>
-                              </p:par>
-                            </p:childTnLst>
-                          </p:cTn>
-                        </p:par>
-                        <p:par>
-                          <p:cTn id="10" fill="hold">
-                            <p:stCondLst>
-                              <p:cond delay="1000"/>
-                            </p:stCondLst>
-                            <p:childTnLst>
-                              <p:par>
-                                <p:cTn id="11" presetID="42" presetClass="entr" presetSubtype="0" fill="hold" grpId="0" nodeType="afterEffect">
-                                  <p:stCondLst>
-                                    <p:cond delay="0"/>
-                                  </p:stCondLst>
-                                  <p:childTnLst>
-                                    <p:set>
-                                      <p:cBhvr>
-                                        <p:cTn id="12" dur="1" fill="hold">
-                                          <p:stCondLst>
-                                            <p:cond delay="0"/>
-                                          </p:stCondLst>
-                                        </p:cTn>
-                                        <p:tgtEl>
-                                          <p:spTgt spid="8"/>
-                                        </p:tgtEl>
-                                        <p:attrNameLst>
-                                          <p:attrName>style.visibility</p:attrName>
-                                        </p:attrNameLst>
-                                      </p:cBhvr>
-                                      <p:to>
-                                        <p:strVal val="visible"/>
-                                      </p:to>
-                                    </p:set>
-                                    <p:animEffect transition="in" filter="fade">
-                                      <p:cBhvr>
-                                        <p:cTn id="13" dur="1000"/>
-                                        <p:tgtEl>
-                                          <p:spTgt spid="8"/>
-                                        </p:tgtEl>
-                                      </p:cBhvr>
-                                    </p:animEffect>
-                                    <p:anim calcmode="lin" valueType="num">
-                                      <p:cBhvr>
-                                        <p:cTn id="14" dur="1000" fill="hold"/>
-                                        <p:tgtEl>
-                                          <p:spTgt spid="8"/>
-                                        </p:tgtEl>
-                                        <p:attrNameLst>
-                                          <p:attrName>ppt_x</p:attrName>
-                                        </p:attrNameLst>
-                                      </p:cBhvr>
-                                      <p:tavLst>
-                                        <p:tav tm="0">
-                                          <p:val>
-                                            <p:strVal val="#ppt_x"/>
-                                          </p:val>
-                                        </p:tav>
-                                        <p:tav tm="100000">
-                                          <p:val>
-                                            <p:strVal val="#ppt_x"/>
-                                          </p:val>
-                                        </p:tav>
-                                      </p:tavLst>
-                                    </p:anim>
-                                    <p:anim calcmode="lin" valueType="num">
-                                      <p:cBhvr>
-                                        <p:cTn id="15" dur="1000" fill="hold"/>
-                                        <p:tgtEl>
-                                          <p:spTgt spid="8"/>
-                                        </p:tgtEl>
-                                        <p:attrNameLst>
-                                          <p:attrName>ppt_y</p:attrName>
-                                        </p:attrNameLst>
-                                      </p:cBhvr>
-                                      <p:tavLst>
-                                        <p:tav tm="0">
-                                          <p:val>
-                                            <p:strVal val="#ppt_y+.1"/>
-                                          </p:val>
-                                        </p:tav>
-                                        <p:tav tm="100000">
-                                          <p:val>
-                                            <p:strVal val="#ppt_y"/>
-                                          </p:val>
-                                        </p:tav>
-                                      </p:tavLst>
-                                    </p:anim>
-                                  </p:childTnLst>
-                                </p:cTn>
-                              </p:par>
-                            </p:childTnLst>
-                          </p:cTn>
-                        </p:par>
-                        <p:par>
-                          <p:cTn id="16" fill="hold">
-                            <p:stCondLst>
-                              <p:cond delay="2000"/>
-                            </p:stCondLst>
-                            <p:childTnLst>
-                              <p:par>
-                                <p:cTn id="17" presetID="42" presetClass="entr" presetSubtype="0" fill="hold" grpId="0" nodeType="afterEffect">
-                                  <p:stCondLst>
-                                    <p:cond delay="0"/>
-                                  </p:stCondLst>
-                                  <p:childTnLst>
-                                    <p:set>
-                                      <p:cBhvr>
-                                        <p:cTn id="18" dur="1" fill="hold">
-                                          <p:stCondLst>
-                                            <p:cond delay="0"/>
-                                          </p:stCondLst>
-                                        </p:cTn>
-                                        <p:tgtEl>
-                                          <p:spTgt spid="9"/>
-                                        </p:tgtEl>
-                                        <p:attrNameLst>
-                                          <p:attrName>style.visibility</p:attrName>
-                                        </p:attrNameLst>
-                                      </p:cBhvr>
-                                      <p:to>
-                                        <p:strVal val="visible"/>
-                                      </p:to>
-                                    </p:set>
-                                    <p:animEffect transition="in" filter="fade">
-                                      <p:cBhvr>
-                                        <p:cTn id="19" dur="1000"/>
-                                        <p:tgtEl>
-                                          <p:spTgt spid="9"/>
-                                        </p:tgtEl>
-                                      </p:cBhvr>
-                                    </p:animEffect>
-                                    <p:anim calcmode="lin" valueType="num">
-                                      <p:cBhvr>
-                                        <p:cTn id="20" dur="1000" fill="hold"/>
                                         <p:tgtEl>
                                           <p:spTgt spid="9"/>
                                         </p:tgtEl>
@@ -8627,7 +8240,7 @@
                                     </p:anim>
                                     <p:anim calcmode="lin" valueType="num">
                                       <p:cBhvr>
-                                        <p:cTn id="21" dur="1000" fill="hold"/>
+                                        <p:cTn id="15" dur="1000" fill="hold"/>
                                         <p:tgtEl>
                                           <p:spTgt spid="9"/>
                                         </p:tgtEl>
@@ -8774,7 +8387,7 @@
               </a:spcAft>
             </a:pPr>
             <a:r>
-              <a:rPr lang="en-US" sz="6600" b="1" dirty="0">
+              <a:rPr lang="en-US" sz="6600" b="1" dirty="0" smtClean="0">
                 <a:solidFill>
                   <a:srgbClr val="FAC540"/>
                 </a:solidFill>
@@ -8782,7 +8395,7 @@
                 <a:ea typeface="Calibri" panose="020F0502020204030204" pitchFamily="34" charset="0"/>
                 <a:cs typeface="Arial" panose="020B0604020202020204" pitchFamily="34" charset="0"/>
               </a:rPr>
-              <a:t>Gold Adviser</a:t>
+              <a:t>Timeline Graph</a:t>
             </a:r>
             <a:endParaRPr lang="en-US" sz="6600" dirty="0">
               <a:effectLst/>
@@ -8816,40 +8429,45 @@
           <a:lstStyle/>
           <a:p>
             <a:r>
-              <a:rPr lang="en-US" sz="3600" dirty="0">
+              <a:rPr lang="en-US" sz="3600" dirty="0" smtClean="0">
                 <a:solidFill>
                   <a:schemeClr val="bg1"/>
                 </a:solidFill>
               </a:rPr>
-              <a:t>Based on past trends, graph shows possible future values of this commodity.</a:t>
+              <a:t>Showing number of positive and negative posts of users for past 10 days.</a:t>
             </a:r>
+            <a:endParaRPr lang="en-US" sz="3600" dirty="0">
+              <a:solidFill>
+                <a:schemeClr val="bg1"/>
+              </a:solidFill>
+            </a:endParaRPr>
           </a:p>
         </p:txBody>
       </p:sp>
       <p:pic>
         <p:nvPicPr>
-          <p:cNvPr id="9" name="Picture 8">
-            <a:extLst>
-              <a:ext uri="{FF2B5EF4-FFF2-40B4-BE49-F238E27FC236}">
-                <a16:creationId xmlns:a16="http://schemas.microsoft.com/office/drawing/2014/main" id="{DC3FE752-409D-4F67-9A8B-6029849E7610}"/>
-              </a:ext>
-            </a:extLst>
-          </p:cNvPr>
+          <p:cNvPr id="3" name="Picture 2"/>
           <p:cNvPicPr>
             <a:picLocks noChangeAspect="1"/>
           </p:cNvPicPr>
           <p:nvPr/>
         </p:nvPicPr>
         <p:blipFill>
-          <a:blip r:embed="rId3"/>
+          <a:blip r:embed="rId3">
+            <a:extLst>
+              <a:ext uri="{28A0092B-C50C-407E-A947-70E740481C1C}">
+                <a14:useLocalDpi xmlns:a14="http://schemas.microsoft.com/office/drawing/2010/main" val="0"/>
+              </a:ext>
+            </a:extLst>
+          </a:blip>
           <a:stretch>
             <a:fillRect/>
           </a:stretch>
         </p:blipFill>
         <p:spPr>
           <a:xfrm>
-            <a:off x="5016082" y="1075996"/>
-            <a:ext cx="6392167" cy="4706007"/>
+            <a:off x="4391280" y="1533367"/>
+            <a:ext cx="7641771" cy="4218667"/>
           </a:xfrm>
           <a:prstGeom prst="rect">
             <a:avLst/>
@@ -8989,96 +8607,6 @@
                             </p:childTnLst>
                           </p:cTn>
                         </p:par>
-                        <p:par>
-                          <p:cTn id="10" fill="hold">
-                            <p:stCondLst>
-                              <p:cond delay="1000"/>
-                            </p:stCondLst>
-                            <p:childTnLst>
-                              <p:par>
-                                <p:cTn id="11" presetID="42" presetClass="entr" presetSubtype="0" fill="hold" nodeType="afterEffect">
-                                  <p:stCondLst>
-                                    <p:cond delay="0"/>
-                                  </p:stCondLst>
-                                  <p:childTnLst>
-                                    <p:set>
-                                      <p:cBhvr>
-                                        <p:cTn id="12" dur="1" fill="hold">
-                                          <p:stCondLst>
-                                            <p:cond delay="0"/>
-                                          </p:stCondLst>
-                                        </p:cTn>
-                                        <p:tgtEl>
-                                          <p:spTgt spid="9"/>
-                                        </p:tgtEl>
-                                        <p:attrNameLst>
-                                          <p:attrName>style.visibility</p:attrName>
-                                        </p:attrNameLst>
-                                      </p:cBhvr>
-                                      <p:to>
-                                        <p:strVal val="visible"/>
-                                      </p:to>
-                                    </p:set>
-                                    <p:animEffect transition="in" filter="fade">
-                                      <p:cBhvr>
-                                        <p:cTn id="13" dur="1000"/>
-                                        <p:tgtEl>
-                                          <p:spTgt spid="9"/>
-                                        </p:tgtEl>
-                                      </p:cBhvr>
-                                    </p:animEffect>
-                                    <p:anim calcmode="lin" valueType="num">
-                                      <p:cBhvr>
-                                        <p:cTn id="14" dur="1000" fill="hold"/>
-                                        <p:tgtEl>
-                                          <p:spTgt spid="9"/>
-                                        </p:tgtEl>
-                                        <p:attrNameLst>
-                                          <p:attrName>ppt_x</p:attrName>
-                                        </p:attrNameLst>
-                                      </p:cBhvr>
-                                      <p:tavLst>
-                                        <p:tav tm="0">
-                                          <p:val>
-                                            <p:strVal val="#ppt_x"/>
-                                          </p:val>
-                                        </p:tav>
-                                        <p:tav tm="100000">
-                                          <p:val>
-                                            <p:strVal val="#ppt_x"/>
-                                          </p:val>
-                                        </p:tav>
-                                      </p:tavLst>
-                                    </p:anim>
-                                    <p:anim calcmode="lin" valueType="num">
-                                      <p:cBhvr>
-                                        <p:cTn id="15" dur="1000" fill="hold"/>
-                                        <p:tgtEl>
-                                          <p:spTgt spid="9"/>
-                                        </p:tgtEl>
-                                        <p:attrNameLst>
-                                          <p:attrName>ppt_y</p:attrName>
-                                        </p:attrNameLst>
-                                      </p:cBhvr>
-                                      <p:tavLst>
-                                        <p:tav tm="0">
-                                          <p:val>
-                                            <p:strVal val="#ppt_y+.1"/>
-                                          </p:val>
-                                        </p:tav>
-                                        <p:tav tm="100000">
-                                          <p:val>
-                                            <p:strVal val="#ppt_y"/>
-                                          </p:val>
-                                        </p:tav>
-                                      </p:tavLst>
-                                    </p:anim>
-                                  </p:childTnLst>
-                                </p:cTn>
-                              </p:par>
-                            </p:childTnLst>
-                          </p:cTn>
-                        </p:par>
                       </p:childTnLst>
                     </p:cTn>
                   </p:par>
@@ -9172,7 +8700,7 @@
           <a:p>
             <a:pPr algn="ctr"/>
             <a:r>
-              <a:rPr lang="en-US" sz="5400" b="1" dirty="0">
+              <a:rPr lang="en-US" sz="5400" b="1" dirty="0" smtClean="0">
                 <a:ln w="12700" cmpd="sng">
                   <a:solidFill>
                     <a:schemeClr val="accent4"/>
@@ -9183,41 +8711,56 @@
                   <a:srgbClr val="00B0F0"/>
                 </a:solidFill>
               </a:rPr>
-              <a:t>Bank Investment Adviser</a:t>
+              <a:t>Simplicity </a:t>
             </a:r>
+          </a:p>
+          <a:p>
+            <a:pPr algn="ctr"/>
+            <a:r>
+              <a:rPr lang="en-US" sz="5400" b="1" dirty="0" smtClean="0">
+                <a:ln w="12700" cmpd="sng">
+                  <a:solidFill>
+                    <a:schemeClr val="accent4"/>
+                  </a:solidFill>
+                  <a:prstDash val="solid"/>
+                </a:ln>
+                <a:solidFill>
+                  <a:srgbClr val="00B0F0"/>
+                </a:solidFill>
+              </a:rPr>
+              <a:t>For</a:t>
+            </a:r>
+          </a:p>
+          <a:p>
+            <a:pPr algn="ctr"/>
+            <a:r>
+              <a:rPr lang="en-US" sz="5400" b="1" dirty="0" smtClean="0">
+                <a:ln w="12700" cmpd="sng">
+                  <a:solidFill>
+                    <a:schemeClr val="accent4"/>
+                  </a:solidFill>
+                  <a:prstDash val="solid"/>
+                </a:ln>
+                <a:solidFill>
+                  <a:srgbClr val="00B0F0"/>
+                </a:solidFill>
+              </a:rPr>
+              <a:t>User</a:t>
+            </a:r>
+            <a:endParaRPr lang="en-US" sz="5400" b="1" dirty="0">
+              <a:ln w="12700" cmpd="sng">
+                <a:solidFill>
+                  <a:schemeClr val="accent4"/>
+                </a:solidFill>
+                <a:prstDash val="solid"/>
+              </a:ln>
+              <a:solidFill>
+                <a:srgbClr val="00B0F0"/>
+              </a:solidFill>
+            </a:endParaRPr>
           </a:p>
         </p:txBody>
       </p:sp>
-      <p:pic>
-        <p:nvPicPr>
-          <p:cNvPr id="6" name="Picture 5">
-            <a:extLst>
-              <a:ext uri="{FF2B5EF4-FFF2-40B4-BE49-F238E27FC236}">
-                <a16:creationId xmlns:a16="http://schemas.microsoft.com/office/drawing/2014/main" id="{71C13FE6-BACF-4744-B988-F261E8E24362}"/>
-              </a:ext>
-            </a:extLst>
-          </p:cNvPr>
-          <p:cNvPicPr>
-            <a:picLocks noChangeAspect="1"/>
-          </p:cNvPicPr>
-          <p:nvPr/>
-        </p:nvPicPr>
-        <p:blipFill>
-          <a:blip r:embed="rId3"/>
-          <a:stretch>
-            <a:fillRect/>
-          </a:stretch>
-        </p:blipFill>
-        <p:spPr>
-          <a:xfrm>
-            <a:off x="4980961" y="934986"/>
-            <a:ext cx="6430272" cy="4696480"/>
-          </a:xfrm>
-          <a:prstGeom prst="rect">
-            <a:avLst/>
-          </a:prstGeom>
-        </p:spPr>
-      </p:pic>
       <p:sp>
         <p:nvSpPr>
           <p:cNvPr id="7" name="TextBox 6">
@@ -9233,7 +8776,7 @@
         <p:spPr>
           <a:xfrm>
             <a:off x="192764" y="3140765"/>
-            <a:ext cx="3888906" cy="1569660"/>
+            <a:ext cx="3888906" cy="2062103"/>
           </a:xfrm>
           <a:prstGeom prst="rect">
             <a:avLst/>
@@ -9247,16 +8790,51 @@
           <a:lstStyle/>
           <a:p>
             <a:r>
-              <a:rPr lang="en-IN" sz="3200" dirty="0">
+              <a:rPr lang="en-IN" sz="3200" dirty="0" smtClean="0">
                 <a:solidFill>
                   <a:schemeClr val="bg1"/>
                 </a:solidFill>
               </a:rPr>
-              <a:t>Predicts future bank returns based on previous year’s data.</a:t>
+              <a:t>Smart Recommendation System based comparison</a:t>
             </a:r>
+            <a:endParaRPr lang="en-IN" sz="3200" dirty="0">
+              <a:solidFill>
+                <a:schemeClr val="bg1"/>
+              </a:solidFill>
+            </a:endParaRPr>
           </a:p>
         </p:txBody>
       </p:sp>
+      <p:pic>
+        <p:nvPicPr>
+          <p:cNvPr id="3" name="Picture 2"/>
+          <p:cNvPicPr>
+            <a:picLocks noChangeAspect="1"/>
+          </p:cNvPicPr>
+          <p:nvPr/>
+        </p:nvPicPr>
+        <p:blipFill>
+          <a:blip r:embed="rId3">
+            <a:extLst>
+              <a:ext uri="{28A0092B-C50C-407E-A947-70E740481C1C}">
+                <a14:useLocalDpi xmlns:a14="http://schemas.microsoft.com/office/drawing/2010/main" val="0"/>
+              </a:ext>
+            </a:extLst>
+          </a:blip>
+          <a:stretch>
+            <a:fillRect/>
+          </a:stretch>
+        </p:blipFill>
+        <p:spPr>
+          <a:xfrm>
+            <a:off x="4392959" y="1524233"/>
+            <a:ext cx="7650995" cy="3426589"/>
+          </a:xfrm>
+          <a:prstGeom prst="rect">
+            <a:avLst/>
+          </a:prstGeom>
+        </p:spPr>
+      </p:pic>
     </p:spTree>
     <p:extLst>
       <p:ext uri="{BB962C8B-B14F-4D97-AF65-F5344CB8AC3E}">
@@ -9291,7 +8869,7 @@
                             </p:stCondLst>
                             <p:childTnLst>
                               <p:par>
-                                <p:cTn id="5" presetID="42" presetClass="entr" presetSubtype="0" fill="hold" nodeType="afterEffect">
+                                <p:cTn id="5" presetID="42" presetClass="entr" presetSubtype="0" fill="hold" grpId="0" nodeType="afterEffect">
                                   <p:stCondLst>
                                     <p:cond delay="0"/>
                                   </p:stCondLst>
@@ -9299,96 +8877,6 @@
                                     <p:set>
                                       <p:cBhvr>
                                         <p:cTn id="6" dur="1" fill="hold">
-                                          <p:stCondLst>
-                                            <p:cond delay="0"/>
-                                          </p:stCondLst>
-                                        </p:cTn>
-                                        <p:tgtEl>
-                                          <p:spTgt spid="6"/>
-                                        </p:tgtEl>
-                                        <p:attrNameLst>
-                                          <p:attrName>style.visibility</p:attrName>
-                                        </p:attrNameLst>
-                                      </p:cBhvr>
-                                      <p:to>
-                                        <p:strVal val="visible"/>
-                                      </p:to>
-                                    </p:set>
-                                    <p:animEffect transition="in" filter="fade">
-                                      <p:cBhvr>
-                                        <p:cTn id="7" dur="1000"/>
-                                        <p:tgtEl>
-                                          <p:spTgt spid="6"/>
-                                        </p:tgtEl>
-                                      </p:cBhvr>
-                                    </p:animEffect>
-                                    <p:anim calcmode="lin" valueType="num">
-                                      <p:cBhvr>
-                                        <p:cTn id="8" dur="1000" fill="hold"/>
-                                        <p:tgtEl>
-                                          <p:spTgt spid="6"/>
-                                        </p:tgtEl>
-                                        <p:attrNameLst>
-                                          <p:attrName>ppt_x</p:attrName>
-                                        </p:attrNameLst>
-                                      </p:cBhvr>
-                                      <p:tavLst>
-                                        <p:tav tm="0">
-                                          <p:val>
-                                            <p:strVal val="#ppt_x"/>
-                                          </p:val>
-                                        </p:tav>
-                                        <p:tav tm="100000">
-                                          <p:val>
-                                            <p:strVal val="#ppt_x"/>
-                                          </p:val>
-                                        </p:tav>
-                                      </p:tavLst>
-                                    </p:anim>
-                                    <p:anim calcmode="lin" valueType="num">
-                                      <p:cBhvr>
-                                        <p:cTn id="9" dur="1000" fill="hold"/>
-                                        <p:tgtEl>
-                                          <p:spTgt spid="6"/>
-                                        </p:tgtEl>
-                                        <p:attrNameLst>
-                                          <p:attrName>ppt_y</p:attrName>
-                                        </p:attrNameLst>
-                                      </p:cBhvr>
-                                      <p:tavLst>
-                                        <p:tav tm="0">
-                                          <p:val>
-                                            <p:strVal val="#ppt_y+.1"/>
-                                          </p:val>
-                                        </p:tav>
-                                        <p:tav tm="100000">
-                                          <p:val>
-                                            <p:strVal val="#ppt_y"/>
-                                          </p:val>
-                                        </p:tav>
-                                      </p:tavLst>
-                                    </p:anim>
-                                  </p:childTnLst>
-                                </p:cTn>
-                              </p:par>
-                            </p:childTnLst>
-                          </p:cTn>
-                        </p:par>
-                        <p:par>
-                          <p:cTn id="10" fill="hold">
-                            <p:stCondLst>
-                              <p:cond delay="1000"/>
-                            </p:stCondLst>
-                            <p:childTnLst>
-                              <p:par>
-                                <p:cTn id="11" presetID="42" presetClass="entr" presetSubtype="0" fill="hold" grpId="0" nodeType="afterEffect">
-                                  <p:stCondLst>
-                                    <p:cond delay="0"/>
-                                  </p:stCondLst>
-                                  <p:childTnLst>
-                                    <p:set>
-                                      <p:cBhvr>
-                                        <p:cTn id="12" dur="1" fill="hold">
                                           <p:stCondLst>
                                             <p:cond delay="0"/>
                                           </p:stCondLst>
@@ -9406,7 +8894,7 @@
                                     </p:set>
                                     <p:animEffect transition="in" filter="fade">
                                       <p:cBhvr>
-                                        <p:cTn id="13" dur="1000"/>
+                                        <p:cTn id="7" dur="1000"/>
                                         <p:tgtEl>
                                           <p:spTgt spid="7"/>
                                         </p:tgtEl>
@@ -9414,7 +8902,7 @@
                                     </p:animEffect>
                                     <p:anim calcmode="lin" valueType="num">
                                       <p:cBhvr>
-                                        <p:cTn id="14" dur="1000" fill="hold"/>
+                                        <p:cTn id="8" dur="1000" fill="hold"/>
                                         <p:tgtEl>
                                           <p:spTgt spid="7"/>
                                         </p:tgtEl>
@@ -9437,7 +8925,7 @@
                                     </p:anim>
                                     <p:anim calcmode="lin" valueType="num">
                                       <p:cBhvr>
-                                        <p:cTn id="15" dur="1000" fill="hold"/>
+                                        <p:cTn id="9" dur="1000" fill="hold"/>
                                         <p:tgtEl>
                                           <p:spTgt spid="7"/>
                                         </p:tgtEl>
@@ -9496,6 +8984,476 @@
 </file>
 
 <file path=ppt/slides/slide7.xml><?xml version="1.0" encoding="utf-8"?>
+<p:sld xmlns:a="http://schemas.openxmlformats.org/drawingml/2006/main" xmlns:r="http://schemas.openxmlformats.org/officeDocument/2006/relationships" xmlns:p="http://schemas.openxmlformats.org/presentationml/2006/main">
+  <p:cSld>
+    <p:spTree>
+      <p:nvGrpSpPr>
+        <p:cNvPr id="1" name=""/>
+        <p:cNvGrpSpPr/>
+        <p:nvPr/>
+      </p:nvGrpSpPr>
+      <p:grpSpPr>
+        <a:xfrm>
+          <a:off x="0" y="0"/>
+          <a:ext cx="0" cy="0"/>
+          <a:chOff x="0" y="0"/>
+          <a:chExt cx="0" cy="0"/>
+        </a:xfrm>
+      </p:grpSpPr>
+      <p:pic>
+        <p:nvPicPr>
+          <p:cNvPr id="4098" name="Picture 2"/>
+          <p:cNvPicPr>
+            <a:picLocks noChangeAspect="1" noChangeArrowheads="1"/>
+          </p:cNvPicPr>
+          <p:nvPr/>
+        </p:nvPicPr>
+        <p:blipFill>
+          <a:blip r:embed="rId2">
+            <a:clrChange>
+              <a:clrFrom>
+                <a:srgbClr val="FFFFFF"/>
+              </a:clrFrom>
+              <a:clrTo>
+                <a:srgbClr val="FFFFFF">
+                  <a:alpha val="0"/>
+                </a:srgbClr>
+              </a:clrTo>
+            </a:clrChange>
+            <a:extLst>
+              <a:ext uri="{28A0092B-C50C-407E-A947-70E740481C1C}">
+                <a14:useLocalDpi xmlns:a14="http://schemas.microsoft.com/office/drawing/2010/main" val="0"/>
+              </a:ext>
+            </a:extLst>
+          </a:blip>
+          <a:srcRect/>
+          <a:stretch>
+            <a:fillRect/>
+          </a:stretch>
+        </p:blipFill>
+        <p:spPr bwMode="auto">
+          <a:xfrm>
+            <a:off x="-33954" y="-293916"/>
+            <a:ext cx="12416454" cy="7704365"/>
+          </a:xfrm>
+          <a:prstGeom prst="rect">
+            <a:avLst/>
+          </a:prstGeom>
+          <a:noFill/>
+          <a:extLst>
+            <a:ext uri="{909E8E84-426E-40DD-AFC4-6F175D3DCCD1}">
+              <a14:hiddenFill xmlns:a14="http://schemas.microsoft.com/office/drawing/2010/main">
+                <a:solidFill>
+                  <a:srgbClr val="FFFFFF"/>
+                </a:solidFill>
+              </a14:hiddenFill>
+            </a:ext>
+          </a:extLst>
+        </p:spPr>
+      </p:pic>
+      <p:sp>
+        <p:nvSpPr>
+          <p:cNvPr id="7" name="TextBox 6"/>
+          <p:cNvSpPr txBox="1"/>
+          <p:nvPr/>
+        </p:nvSpPr>
+        <p:spPr>
+          <a:xfrm>
+            <a:off x="7814938" y="117480"/>
+            <a:ext cx="4377062" cy="1446550"/>
+          </a:xfrm>
+          <a:prstGeom prst="rect">
+            <a:avLst/>
+          </a:prstGeom>
+          <a:noFill/>
+        </p:spPr>
+        <p:txBody>
+          <a:bodyPr wrap="square" rtlCol="0">
+            <a:spAutoFit/>
+          </a:bodyPr>
+          <a:lstStyle/>
+          <a:p>
+            <a:pPr algn="ctr"/>
+            <a:r>
+              <a:rPr lang="en-US" sz="4400" b="1" dirty="0" smtClean="0">
+                <a:solidFill>
+                  <a:srgbClr val="FAC540"/>
+                </a:solidFill>
+                <a:latin typeface="Arial" panose="020B0604020202020204" pitchFamily="34" charset="0"/>
+              </a:rPr>
+              <a:t>Get Real Time</a:t>
+            </a:r>
+          </a:p>
+          <a:p>
+            <a:pPr algn="ctr"/>
+            <a:r>
+              <a:rPr lang="en-US" sz="4400" b="1" dirty="0" smtClean="0">
+                <a:solidFill>
+                  <a:srgbClr val="FAC540"/>
+                </a:solidFill>
+                <a:latin typeface="Arial" panose="020B0604020202020204" pitchFamily="34" charset="0"/>
+              </a:rPr>
+              <a:t>Status</a:t>
+            </a:r>
+            <a:endParaRPr lang="en-US" sz="4400" b="1" dirty="0">
+              <a:solidFill>
+                <a:srgbClr val="FAC540"/>
+              </a:solidFill>
+              <a:latin typeface="Arial" panose="020B0604020202020204" pitchFamily="34" charset="0"/>
+            </a:endParaRPr>
+          </a:p>
+        </p:txBody>
+      </p:sp>
+      <p:sp>
+        <p:nvSpPr>
+          <p:cNvPr id="8" name="TextBox 7">
+            <a:extLst>
+              <a:ext uri="{FF2B5EF4-FFF2-40B4-BE49-F238E27FC236}">
+                <a16:creationId xmlns:a16="http://schemas.microsoft.com/office/drawing/2014/main" id="{19F62868-1AE2-418D-8A3C-0CEB6F3D8CAF}"/>
+              </a:ext>
+            </a:extLst>
+          </p:cNvPr>
+          <p:cNvSpPr txBox="1"/>
+          <p:nvPr/>
+        </p:nvSpPr>
+        <p:spPr>
+          <a:xfrm>
+            <a:off x="8214425" y="1736890"/>
+            <a:ext cx="3578087" cy="3970318"/>
+          </a:xfrm>
+          <a:prstGeom prst="rect">
+            <a:avLst/>
+          </a:prstGeom>
+          <a:noFill/>
+        </p:spPr>
+        <p:txBody>
+          <a:bodyPr wrap="square" rtlCol="0">
+            <a:spAutoFit/>
+          </a:bodyPr>
+          <a:lstStyle/>
+          <a:p>
+            <a:r>
+              <a:rPr lang="en-IN" sz="2800" dirty="0" smtClean="0">
+                <a:solidFill>
+                  <a:schemeClr val="bg1"/>
+                </a:solidFill>
+              </a:rPr>
+              <a:t>Classifying Posts into their respective categories – placate the implacable</a:t>
+            </a:r>
+          </a:p>
+          <a:p>
+            <a:endParaRPr lang="en-IN" sz="2800" dirty="0">
+              <a:solidFill>
+                <a:schemeClr val="bg1"/>
+              </a:solidFill>
+            </a:endParaRPr>
+          </a:p>
+          <a:p>
+            <a:r>
+              <a:rPr lang="en-IN" sz="2800" dirty="0" smtClean="0">
+                <a:solidFill>
+                  <a:schemeClr val="bg1"/>
+                </a:solidFill>
+              </a:rPr>
+              <a:t>Make better products, politicians, restaurants and more!</a:t>
+            </a:r>
+            <a:endParaRPr lang="en-IN" sz="2800" dirty="0">
+              <a:solidFill>
+                <a:schemeClr val="bg1"/>
+              </a:solidFill>
+            </a:endParaRPr>
+          </a:p>
+          <a:p>
+            <a:endParaRPr lang="en-IN" sz="2800" dirty="0">
+              <a:solidFill>
+                <a:schemeClr val="bg1"/>
+              </a:solidFill>
+            </a:endParaRPr>
+          </a:p>
+        </p:txBody>
+      </p:sp>
+      <p:pic>
+        <p:nvPicPr>
+          <p:cNvPr id="3" name="Picture 2"/>
+          <p:cNvPicPr>
+            <a:picLocks noChangeAspect="1"/>
+          </p:cNvPicPr>
+          <p:nvPr/>
+        </p:nvPicPr>
+        <p:blipFill>
+          <a:blip r:embed="rId3">
+            <a:extLst>
+              <a:ext uri="{28A0092B-C50C-407E-A947-70E740481C1C}">
+                <a14:useLocalDpi xmlns:a14="http://schemas.microsoft.com/office/drawing/2010/main" val="0"/>
+              </a:ext>
+            </a:extLst>
+          </a:blip>
+          <a:stretch>
+            <a:fillRect/>
+          </a:stretch>
+        </p:blipFill>
+        <p:spPr>
+          <a:xfrm>
+            <a:off x="1272523" y="886920"/>
+            <a:ext cx="5717487" cy="4808485"/>
+          </a:xfrm>
+          <a:prstGeom prst="rect">
+            <a:avLst/>
+          </a:prstGeom>
+        </p:spPr>
+      </p:pic>
+    </p:spTree>
+    <p:extLst>
+      <p:ext uri="{BB962C8B-B14F-4D97-AF65-F5344CB8AC3E}">
+        <p14:creationId xmlns:p14="http://schemas.microsoft.com/office/powerpoint/2010/main" val="3337824063"/>
+      </p:ext>
+    </p:extLst>
+  </p:cSld>
+  <p:clrMapOvr>
+    <a:masterClrMapping/>
+  </p:clrMapOvr>
+  <p:timing>
+    <p:tnLst>
+      <p:par>
+        <p:cTn id="1" dur="indefinite" restart="never" nodeType="tmRoot">
+          <p:childTnLst>
+            <p:seq concurrent="1" nextAc="seek">
+              <p:cTn id="2" dur="indefinite" nodeType="mainSeq">
+                <p:childTnLst>
+                  <p:par>
+                    <p:cTn id="3" fill="hold">
+                      <p:stCondLst>
+                        <p:cond delay="indefinite"/>
+                        <p:cond evt="onBegin" delay="0">
+                          <p:tn val="2"/>
+                        </p:cond>
+                      </p:stCondLst>
+                      <p:childTnLst>
+                        <p:par>
+                          <p:cTn id="4" fill="hold">
+                            <p:stCondLst>
+                              <p:cond delay="0"/>
+                            </p:stCondLst>
+                            <p:childTnLst>
+                              <p:par>
+                                <p:cTn id="5" presetID="42" presetClass="entr" presetSubtype="0" fill="hold" grpId="0" nodeType="afterEffect">
+                                  <p:stCondLst>
+                                    <p:cond delay="0"/>
+                                  </p:stCondLst>
+                                  <p:childTnLst>
+                                    <p:set>
+                                      <p:cBhvr>
+                                        <p:cTn id="6" dur="1" fill="hold">
+                                          <p:stCondLst>
+                                            <p:cond delay="0"/>
+                                          </p:stCondLst>
+                                        </p:cTn>
+                                        <p:tgtEl>
+                                          <p:spTgt spid="8"/>
+                                        </p:tgtEl>
+                                        <p:attrNameLst>
+                                          <p:attrName>style.visibility</p:attrName>
+                                        </p:attrNameLst>
+                                      </p:cBhvr>
+                                      <p:to>
+                                        <p:strVal val="visible"/>
+                                      </p:to>
+                                    </p:set>
+                                    <p:animEffect transition="in" filter="fade">
+                                      <p:cBhvr>
+                                        <p:cTn id="7" dur="1000"/>
+                                        <p:tgtEl>
+                                          <p:spTgt spid="8"/>
+                                        </p:tgtEl>
+                                      </p:cBhvr>
+                                    </p:animEffect>
+                                    <p:anim calcmode="lin" valueType="num">
+                                      <p:cBhvr>
+                                        <p:cTn id="8" dur="1000" fill="hold"/>
+                                        <p:tgtEl>
+                                          <p:spTgt spid="8"/>
+                                        </p:tgtEl>
+                                        <p:attrNameLst>
+                                          <p:attrName>ppt_x</p:attrName>
+                                        </p:attrNameLst>
+                                      </p:cBhvr>
+                                      <p:tavLst>
+                                        <p:tav tm="0">
+                                          <p:val>
+                                            <p:strVal val="#ppt_x"/>
+                                          </p:val>
+                                        </p:tav>
+                                        <p:tav tm="100000">
+                                          <p:val>
+                                            <p:strVal val="#ppt_x"/>
+                                          </p:val>
+                                        </p:tav>
+                                      </p:tavLst>
+                                    </p:anim>
+                                    <p:anim calcmode="lin" valueType="num">
+                                      <p:cBhvr>
+                                        <p:cTn id="9" dur="1000" fill="hold"/>
+                                        <p:tgtEl>
+                                          <p:spTgt spid="8"/>
+                                        </p:tgtEl>
+                                        <p:attrNameLst>
+                                          <p:attrName>ppt_y</p:attrName>
+                                        </p:attrNameLst>
+                                      </p:cBhvr>
+                                      <p:tavLst>
+                                        <p:tav tm="0">
+                                          <p:val>
+                                            <p:strVal val="#ppt_y+.1"/>
+                                          </p:val>
+                                        </p:tav>
+                                        <p:tav tm="100000">
+                                          <p:val>
+                                            <p:strVal val="#ppt_y"/>
+                                          </p:val>
+                                        </p:tav>
+                                      </p:tavLst>
+                                    </p:anim>
+                                  </p:childTnLst>
+                                </p:cTn>
+                              </p:par>
+                            </p:childTnLst>
+                          </p:cTn>
+                        </p:par>
+                      </p:childTnLst>
+                    </p:cTn>
+                  </p:par>
+                </p:childTnLst>
+              </p:cTn>
+              <p:prevCondLst>
+                <p:cond evt="onPrev" delay="0">
+                  <p:tgtEl>
+                    <p:sldTgt/>
+                  </p:tgtEl>
+                </p:cond>
+              </p:prevCondLst>
+              <p:nextCondLst>
+                <p:cond evt="onNext" delay="0">
+                  <p:tgtEl>
+                    <p:sldTgt/>
+                  </p:tgtEl>
+                </p:cond>
+              </p:nextCondLst>
+            </p:seq>
+          </p:childTnLst>
+        </p:cTn>
+      </p:par>
+    </p:tnLst>
+    <p:bldLst>
+      <p:bldP spid="8" grpId="0"/>
+    </p:bldLst>
+  </p:timing>
+</p:sld>
+</file>
+
+<file path=ppt/slides/slide8.xml><?xml version="1.0" encoding="utf-8"?>
+<p:sld xmlns:a="http://schemas.openxmlformats.org/drawingml/2006/main" xmlns:r="http://schemas.openxmlformats.org/officeDocument/2006/relationships" xmlns:p="http://schemas.openxmlformats.org/presentationml/2006/main">
+  <p:cSld>
+    <p:spTree>
+      <p:nvGrpSpPr>
+        <p:cNvPr id="1" name=""/>
+        <p:cNvGrpSpPr/>
+        <p:nvPr/>
+      </p:nvGrpSpPr>
+      <p:grpSpPr>
+        <a:xfrm>
+          <a:off x="0" y="0"/>
+          <a:ext cx="0" cy="0"/>
+          <a:chOff x="0" y="0"/>
+          <a:chExt cx="0" cy="0"/>
+        </a:xfrm>
+      </p:grpSpPr>
+      <p:sp>
+        <p:nvSpPr>
+          <p:cNvPr id="2" name="Title 1"/>
+          <p:cNvSpPr>
+            <a:spLocks noGrp="1"/>
+          </p:cNvSpPr>
+          <p:nvPr>
+            <p:ph type="title"/>
+          </p:nvPr>
+        </p:nvSpPr>
+        <p:spPr>
+          <a:xfrm>
+            <a:off x="1071155" y="199505"/>
+            <a:ext cx="10557372" cy="1492132"/>
+          </a:xfrm>
+        </p:spPr>
+        <p:txBody>
+          <a:bodyPr/>
+          <a:lstStyle/>
+          <a:p>
+            <a:pPr algn="ctr"/>
+            <a:r>
+              <a:rPr lang="en-US" dirty="0" smtClean="0"/>
+              <a:t>Comparison PAGE</a:t>
+            </a:r>
+            <a:r>
+              <a:rPr lang="en-US" dirty="0" smtClean="0"/>
+              <a:t/>
+            </a:r>
+            <a:br>
+              <a:rPr lang="en-US" dirty="0" smtClean="0"/>
+            </a:br>
+            <a:endParaRPr lang="en-US" dirty="0"/>
+          </a:p>
+        </p:txBody>
+      </p:sp>
+      <p:pic>
+        <p:nvPicPr>
+          <p:cNvPr id="3" name="Picture 2"/>
+          <p:cNvPicPr>
+            <a:picLocks noChangeAspect="1"/>
+          </p:cNvPicPr>
+          <p:nvPr/>
+        </p:nvPicPr>
+        <p:blipFill>
+          <a:blip r:embed="rId2">
+            <a:extLst>
+              <a:ext uri="{28A0092B-C50C-407E-A947-70E740481C1C}">
+                <a14:useLocalDpi xmlns:a14="http://schemas.microsoft.com/office/drawing/2010/main" val="0"/>
+              </a:ext>
+            </a:extLst>
+          </a:blip>
+          <a:stretch>
+            <a:fillRect/>
+          </a:stretch>
+        </p:blipFill>
+        <p:spPr>
+          <a:xfrm>
+            <a:off x="1071154" y="1099903"/>
+            <a:ext cx="10601053" cy="5366211"/>
+          </a:xfrm>
+          <a:prstGeom prst="rect">
+            <a:avLst/>
+          </a:prstGeom>
+        </p:spPr>
+      </p:pic>
+    </p:spTree>
+    <p:extLst>
+      <p:ext uri="{BB962C8B-B14F-4D97-AF65-F5344CB8AC3E}">
+        <p14:creationId xmlns:p14="http://schemas.microsoft.com/office/powerpoint/2010/main" val="2719813962"/>
+      </p:ext>
+    </p:extLst>
+  </p:cSld>
+  <p:clrMapOvr>
+    <a:masterClrMapping/>
+  </p:clrMapOvr>
+  <p:timing>
+    <p:tnLst>
+      <p:par>
+        <p:cTn id="1" dur="indefinite" restart="never" nodeType="tmRoot"/>
+      </p:par>
+    </p:tnLst>
+  </p:timing>
+</p:sld>
+</file>
+
+<file path=ppt/slides/slide9.xml><?xml version="1.0" encoding="utf-8"?>
 <p:sld xmlns:a="http://schemas.openxmlformats.org/drawingml/2006/main" xmlns:r="http://schemas.openxmlformats.org/officeDocument/2006/relationships" xmlns:p="http://schemas.openxmlformats.org/presentationml/2006/main">
   <p:cSld>
     <p:spTree>

</xml_diff>